<commit_message>
Presentacion pa hacer tablas bonitas
</commit_message>
<xml_diff>
--- a/Tesis/Tesis Convencional/PP_ConstruyendoAmano.pptx
+++ b/Tesis/Tesis Convencional/PP_ConstruyendoAmano.pptx
@@ -6,6 +6,7 @@
   </p:sldMasterIdLst>
   <p:sldIdLst>
     <p:sldId id="256" r:id="rId2"/>
+    <p:sldId id="257" r:id="rId3"/>
   </p:sldIdLst>
   <p:sldSz cx="12192000" cy="6858000"/>
   <p:notesSz cx="6858000" cy="9144000"/>
@@ -254,7 +255,7 @@
           <a:p>
             <a:fld id="{DE1850C6-5651-466F-AE95-2FBC276BA210}" type="datetimeFigureOut">
               <a:rPr lang="es-MX" smtClean="0"/>
-              <a:t>03/05/2017</a:t>
+              <a:t>20/07/2017</a:t>
             </a:fld>
             <a:endParaRPr lang="es-MX"/>
           </a:p>
@@ -424,7 +425,7 @@
           <a:p>
             <a:fld id="{DE1850C6-5651-466F-AE95-2FBC276BA210}" type="datetimeFigureOut">
               <a:rPr lang="es-MX" smtClean="0"/>
-              <a:t>03/05/2017</a:t>
+              <a:t>20/07/2017</a:t>
             </a:fld>
             <a:endParaRPr lang="es-MX"/>
           </a:p>
@@ -604,7 +605,7 @@
           <a:p>
             <a:fld id="{DE1850C6-5651-466F-AE95-2FBC276BA210}" type="datetimeFigureOut">
               <a:rPr lang="es-MX" smtClean="0"/>
-              <a:t>03/05/2017</a:t>
+              <a:t>20/07/2017</a:t>
             </a:fld>
             <a:endParaRPr lang="es-MX"/>
           </a:p>
@@ -774,7 +775,7 @@
           <a:p>
             <a:fld id="{DE1850C6-5651-466F-AE95-2FBC276BA210}" type="datetimeFigureOut">
               <a:rPr lang="es-MX" smtClean="0"/>
-              <a:t>03/05/2017</a:t>
+              <a:t>20/07/2017</a:t>
             </a:fld>
             <a:endParaRPr lang="es-MX"/>
           </a:p>
@@ -1020,7 +1021,7 @@
           <a:p>
             <a:fld id="{DE1850C6-5651-466F-AE95-2FBC276BA210}" type="datetimeFigureOut">
               <a:rPr lang="es-MX" smtClean="0"/>
-              <a:t>03/05/2017</a:t>
+              <a:t>20/07/2017</a:t>
             </a:fld>
             <a:endParaRPr lang="es-MX"/>
           </a:p>
@@ -1252,7 +1253,7 @@
           <a:p>
             <a:fld id="{DE1850C6-5651-466F-AE95-2FBC276BA210}" type="datetimeFigureOut">
               <a:rPr lang="es-MX" smtClean="0"/>
-              <a:t>03/05/2017</a:t>
+              <a:t>20/07/2017</a:t>
             </a:fld>
             <a:endParaRPr lang="es-MX"/>
           </a:p>
@@ -1619,7 +1620,7 @@
           <a:p>
             <a:fld id="{DE1850C6-5651-466F-AE95-2FBC276BA210}" type="datetimeFigureOut">
               <a:rPr lang="es-MX" smtClean="0"/>
-              <a:t>03/05/2017</a:t>
+              <a:t>20/07/2017</a:t>
             </a:fld>
             <a:endParaRPr lang="es-MX"/>
           </a:p>
@@ -1737,7 +1738,7 @@
           <a:p>
             <a:fld id="{DE1850C6-5651-466F-AE95-2FBC276BA210}" type="datetimeFigureOut">
               <a:rPr lang="es-MX" smtClean="0"/>
-              <a:t>03/05/2017</a:t>
+              <a:t>20/07/2017</a:t>
             </a:fld>
             <a:endParaRPr lang="es-MX"/>
           </a:p>
@@ -1832,7 +1833,7 @@
           <a:p>
             <a:fld id="{DE1850C6-5651-466F-AE95-2FBC276BA210}" type="datetimeFigureOut">
               <a:rPr lang="es-MX" smtClean="0"/>
-              <a:t>03/05/2017</a:t>
+              <a:t>20/07/2017</a:t>
             </a:fld>
             <a:endParaRPr lang="es-MX"/>
           </a:p>
@@ -2109,7 +2110,7 @@
           <a:p>
             <a:fld id="{DE1850C6-5651-466F-AE95-2FBC276BA210}" type="datetimeFigureOut">
               <a:rPr lang="es-MX" smtClean="0"/>
-              <a:t>03/05/2017</a:t>
+              <a:t>20/07/2017</a:t>
             </a:fld>
             <a:endParaRPr lang="es-MX"/>
           </a:p>
@@ -2362,7 +2363,7 @@
           <a:p>
             <a:fld id="{DE1850C6-5651-466F-AE95-2FBC276BA210}" type="datetimeFigureOut">
               <a:rPr lang="es-MX" smtClean="0"/>
-              <a:t>03/05/2017</a:t>
+              <a:t>20/07/2017</a:t>
             </a:fld>
             <a:endParaRPr lang="es-MX"/>
           </a:p>
@@ -2575,7 +2576,7 @@
           <a:p>
             <a:fld id="{DE1850C6-5651-466F-AE95-2FBC276BA210}" type="datetimeFigureOut">
               <a:rPr lang="es-MX" smtClean="0"/>
-              <a:t>03/05/2017</a:t>
+              <a:t>20/07/2017</a:t>
             </a:fld>
             <a:endParaRPr lang="es-MX"/>
           </a:p>
@@ -2990,7 +2991,12 @@
             <p:ph type="ctrTitle"/>
           </p:nvPr>
         </p:nvSpPr>
-        <p:spPr/>
+        <p:spPr>
+          <a:xfrm>
+            <a:off x="1687773" y="1030752"/>
+            <a:ext cx="9144000" cy="2387600"/>
+          </a:xfrm>
+        </p:spPr>
         <p:txBody>
           <a:bodyPr/>
           <a:lstStyle/>
@@ -3036,8 +3042,8 @@
         </p:nvSpPr>
         <p:spPr>
           <a:xfrm>
-            <a:off x="3579962" y="1769575"/>
-            <a:ext cx="3001992" cy="1733909"/>
+            <a:off x="4094672" y="1961687"/>
+            <a:ext cx="2487282" cy="1541797"/>
           </a:xfrm>
           <a:prstGeom prst="rect">
             <a:avLst/>
@@ -3062,20 +3068,352 @@
           <a:lstStyle/>
           <a:p>
             <a:pPr algn="ctr"/>
-            <a:endParaRPr lang="es-MX"/>
-          </a:p>
-        </p:txBody>
-      </p:sp>
-      <p:sp>
-        <p:nvSpPr>
-          <p:cNvPr id="5" name="Rectángulo 4"/>
+            <a:r>
+              <a:rPr lang="es-MX" sz="2200" b="1" dirty="0" smtClean="0">
+                <a:solidFill>
+                  <a:schemeClr val="accent3">
+                    <a:lumMod val="75000"/>
+                  </a:schemeClr>
+                </a:solidFill>
+              </a:rPr>
+              <a:t>Hit</a:t>
+            </a:r>
+            <a:endParaRPr lang="es-MX" sz="2200" b="1" dirty="0" smtClean="0">
+              <a:solidFill>
+                <a:schemeClr val="accent3">
+                  <a:lumMod val="75000"/>
+                </a:schemeClr>
+              </a:solidFill>
+            </a:endParaRPr>
+          </a:p>
+          <a:p>
+            <a:pPr algn="ctr"/>
+            <a:r>
+              <a:rPr lang="es-MX" sz="2000" dirty="0" smtClean="0">
+                <a:solidFill>
+                  <a:schemeClr val="bg2">
+                    <a:lumMod val="50000"/>
+                  </a:schemeClr>
+                </a:solidFill>
+              </a:rPr>
+              <a:t>(Acierto)</a:t>
+            </a:r>
+            <a:endParaRPr lang="es-MX" sz="2000" dirty="0">
+              <a:solidFill>
+                <a:schemeClr val="bg2">
+                  <a:lumMod val="50000"/>
+                </a:schemeClr>
+              </a:solidFill>
+            </a:endParaRPr>
+          </a:p>
+        </p:txBody>
+      </p:sp>
+      <p:sp>
+        <p:nvSpPr>
+          <p:cNvPr id="8" name="CuadroTexto 7"/>
+          <p:cNvSpPr txBox="1"/>
+          <p:nvPr/>
+        </p:nvSpPr>
+        <p:spPr>
+          <a:xfrm>
+            <a:off x="4977441" y="1130646"/>
+            <a:ext cx="3571336" cy="477054"/>
+          </a:xfrm>
+          <a:prstGeom prst="rect">
+            <a:avLst/>
+          </a:prstGeom>
+          <a:noFill/>
+        </p:spPr>
+        <p:txBody>
+          <a:bodyPr wrap="square" rtlCol="0">
+            <a:spAutoFit/>
+          </a:bodyPr>
+          <a:lstStyle/>
+          <a:p>
+            <a:pPr algn="ctr"/>
+            <a:r>
+              <a:rPr lang="es-MX" sz="2500" b="1" dirty="0" smtClean="0">
+                <a:latin typeface="Times New Roman" panose="02020603050405020304" pitchFamily="18" charset="0"/>
+                <a:cs typeface="Times New Roman" panose="02020603050405020304" pitchFamily="18" charset="0"/>
+              </a:rPr>
+              <a:t>Estado </a:t>
+            </a:r>
+            <a:r>
+              <a:rPr lang="es-MX" sz="2500" b="1" dirty="0" smtClean="0">
+                <a:latin typeface="Times New Roman" panose="02020603050405020304" pitchFamily="18" charset="0"/>
+                <a:cs typeface="Times New Roman" panose="02020603050405020304" pitchFamily="18" charset="0"/>
+              </a:rPr>
+              <a:t>real </a:t>
+            </a:r>
+            <a:r>
+              <a:rPr lang="es-MX" sz="2500" b="1" dirty="0" smtClean="0">
+                <a:latin typeface="Times New Roman" panose="02020603050405020304" pitchFamily="18" charset="0"/>
+                <a:cs typeface="Times New Roman" panose="02020603050405020304" pitchFamily="18" charset="0"/>
+              </a:rPr>
+              <a:t>del </a:t>
+            </a:r>
+            <a:r>
+              <a:rPr lang="es-MX" sz="2500" b="1" dirty="0" smtClean="0">
+                <a:latin typeface="Times New Roman" panose="02020603050405020304" pitchFamily="18" charset="0"/>
+                <a:cs typeface="Times New Roman" panose="02020603050405020304" pitchFamily="18" charset="0"/>
+              </a:rPr>
+              <a:t>mundo</a:t>
+            </a:r>
+            <a:endParaRPr lang="es-MX" sz="2500" b="1" dirty="0">
+              <a:latin typeface="Times New Roman" panose="02020603050405020304" pitchFamily="18" charset="0"/>
+              <a:cs typeface="Times New Roman" panose="02020603050405020304" pitchFamily="18" charset="0"/>
+            </a:endParaRPr>
+          </a:p>
+        </p:txBody>
+      </p:sp>
+      <p:sp>
+        <p:nvSpPr>
+          <p:cNvPr id="9" name="CuadroTexto 8"/>
+          <p:cNvSpPr txBox="1"/>
+          <p:nvPr/>
+        </p:nvSpPr>
+        <p:spPr>
+          <a:xfrm rot="16200000">
+            <a:off x="1158677" y="3296922"/>
+            <a:ext cx="3571336" cy="477054"/>
+          </a:xfrm>
+          <a:prstGeom prst="rect">
+            <a:avLst/>
+          </a:prstGeom>
+          <a:noFill/>
+        </p:spPr>
+        <p:txBody>
+          <a:bodyPr wrap="square" rtlCol="0">
+            <a:spAutoFit/>
+          </a:bodyPr>
+          <a:lstStyle/>
+          <a:p>
+            <a:pPr algn="ctr"/>
+            <a:r>
+              <a:rPr lang="es-MX" sz="2500" b="1" dirty="0" smtClean="0">
+                <a:latin typeface="Times New Roman" panose="02020603050405020304" pitchFamily="18" charset="0"/>
+                <a:cs typeface="Times New Roman" panose="02020603050405020304" pitchFamily="18" charset="0"/>
+              </a:rPr>
+              <a:t>Juicio de detección</a:t>
+            </a:r>
+            <a:endParaRPr lang="es-MX" sz="2500" b="1" dirty="0">
+              <a:latin typeface="Times New Roman" panose="02020603050405020304" pitchFamily="18" charset="0"/>
+              <a:cs typeface="Times New Roman" panose="02020603050405020304" pitchFamily="18" charset="0"/>
+            </a:endParaRPr>
+          </a:p>
+        </p:txBody>
+      </p:sp>
+      <p:sp>
+        <p:nvSpPr>
+          <p:cNvPr id="10" name="CuadroTexto 9"/>
+          <p:cNvSpPr txBox="1"/>
+          <p:nvPr/>
+        </p:nvSpPr>
+        <p:spPr>
+          <a:xfrm>
+            <a:off x="4336273" y="1575213"/>
+            <a:ext cx="2467155" cy="415498"/>
+          </a:xfrm>
+          <a:prstGeom prst="rect">
+            <a:avLst/>
+          </a:prstGeom>
+          <a:noFill/>
+        </p:spPr>
+        <p:txBody>
+          <a:bodyPr wrap="square" rtlCol="0">
+            <a:spAutoFit/>
+          </a:bodyPr>
+          <a:lstStyle/>
+          <a:p>
+            <a:r>
+              <a:rPr lang="es-MX" sz="2100" dirty="0" smtClean="0">
+                <a:latin typeface="Times New Roman" panose="02020603050405020304" pitchFamily="18" charset="0"/>
+                <a:cs typeface="Times New Roman" panose="02020603050405020304" pitchFamily="18" charset="0"/>
+              </a:rPr>
+              <a:t>         Señal</a:t>
+            </a:r>
+            <a:endParaRPr lang="es-MX" sz="2100" dirty="0">
+              <a:latin typeface="Times New Roman" panose="02020603050405020304" pitchFamily="18" charset="0"/>
+              <a:cs typeface="Times New Roman" panose="02020603050405020304" pitchFamily="18" charset="0"/>
+            </a:endParaRPr>
+          </a:p>
+        </p:txBody>
+      </p:sp>
+      <p:sp>
+        <p:nvSpPr>
+          <p:cNvPr id="11" name="CuadroTexto 10"/>
+          <p:cNvSpPr txBox="1"/>
+          <p:nvPr/>
+        </p:nvSpPr>
+        <p:spPr>
+          <a:xfrm>
+            <a:off x="6602081" y="1568734"/>
+            <a:ext cx="2467155" cy="415498"/>
+          </a:xfrm>
+          <a:prstGeom prst="rect">
+            <a:avLst/>
+          </a:prstGeom>
+          <a:noFill/>
+        </p:spPr>
+        <p:txBody>
+          <a:bodyPr wrap="square" rtlCol="0">
+            <a:spAutoFit/>
+          </a:bodyPr>
+          <a:lstStyle/>
+          <a:p>
+            <a:r>
+              <a:rPr lang="es-MX" sz="2100" dirty="0" smtClean="0">
+                <a:latin typeface="Times New Roman" panose="02020603050405020304" pitchFamily="18" charset="0"/>
+                <a:cs typeface="Times New Roman" panose="02020603050405020304" pitchFamily="18" charset="0"/>
+              </a:rPr>
+              <a:t>             Ruido</a:t>
+            </a:r>
+            <a:endParaRPr lang="es-MX" sz="2100" dirty="0">
+              <a:latin typeface="Times New Roman" panose="02020603050405020304" pitchFamily="18" charset="0"/>
+              <a:cs typeface="Times New Roman" panose="02020603050405020304" pitchFamily="18" charset="0"/>
+            </a:endParaRPr>
+          </a:p>
+        </p:txBody>
+      </p:sp>
+      <p:sp>
+        <p:nvSpPr>
+          <p:cNvPr id="12" name="CuadroTexto 11"/>
+          <p:cNvSpPr txBox="1"/>
+          <p:nvPr/>
+        </p:nvSpPr>
+        <p:spPr>
+          <a:xfrm rot="16200000">
+            <a:off x="2760567" y="2260387"/>
+            <a:ext cx="1820531" cy="738664"/>
+          </a:xfrm>
+          <a:prstGeom prst="rect">
+            <a:avLst/>
+          </a:prstGeom>
+          <a:noFill/>
+        </p:spPr>
+        <p:txBody>
+          <a:bodyPr wrap="square" rtlCol="0">
+            <a:spAutoFit/>
+          </a:bodyPr>
+          <a:lstStyle/>
+          <a:p>
+            <a:pPr algn="ctr"/>
+            <a:r>
+              <a:rPr lang="es-MX" sz="2100" dirty="0" smtClean="0">
+                <a:latin typeface="Times New Roman" panose="02020603050405020304" pitchFamily="18" charset="0"/>
+                <a:cs typeface="Times New Roman" panose="02020603050405020304" pitchFamily="18" charset="0"/>
+              </a:rPr>
+              <a:t>“Sí</a:t>
+            </a:r>
+            <a:r>
+              <a:rPr lang="es-MX" sz="2100" dirty="0" smtClean="0">
+                <a:latin typeface="Times New Roman" panose="02020603050405020304" pitchFamily="18" charset="0"/>
+                <a:cs typeface="Times New Roman" panose="02020603050405020304" pitchFamily="18" charset="0"/>
+              </a:rPr>
+              <a:t>, </a:t>
+            </a:r>
+            <a:r>
+              <a:rPr lang="es-MX" sz="2100" dirty="0" smtClean="0">
+                <a:latin typeface="Times New Roman" panose="02020603050405020304" pitchFamily="18" charset="0"/>
+                <a:cs typeface="Times New Roman" panose="02020603050405020304" pitchFamily="18" charset="0"/>
+              </a:rPr>
+              <a:t> ahí está</a:t>
+            </a:r>
+          </a:p>
+          <a:p>
+            <a:pPr algn="ctr"/>
+            <a:r>
+              <a:rPr lang="es-MX" sz="2100" dirty="0" smtClean="0">
+                <a:latin typeface="Times New Roman" panose="02020603050405020304" pitchFamily="18" charset="0"/>
+                <a:cs typeface="Times New Roman" panose="02020603050405020304" pitchFamily="18" charset="0"/>
+              </a:rPr>
+              <a:t>la señal”</a:t>
+            </a:r>
+            <a:endParaRPr lang="es-MX" sz="2100" dirty="0">
+              <a:latin typeface="Times New Roman" panose="02020603050405020304" pitchFamily="18" charset="0"/>
+              <a:cs typeface="Times New Roman" panose="02020603050405020304" pitchFamily="18" charset="0"/>
+            </a:endParaRPr>
+          </a:p>
+        </p:txBody>
+      </p:sp>
+      <p:sp>
+        <p:nvSpPr>
+          <p:cNvPr id="13" name="CuadroTexto 12"/>
+          <p:cNvSpPr txBox="1"/>
+          <p:nvPr/>
+        </p:nvSpPr>
+        <p:spPr>
+          <a:xfrm rot="16200000">
+            <a:off x="2796960" y="3988181"/>
+            <a:ext cx="1708059" cy="738664"/>
+          </a:xfrm>
+          <a:prstGeom prst="rect">
+            <a:avLst/>
+          </a:prstGeom>
+          <a:noFill/>
+        </p:spPr>
+        <p:txBody>
+          <a:bodyPr wrap="square" rtlCol="0">
+            <a:spAutoFit/>
+          </a:bodyPr>
+          <a:lstStyle/>
+          <a:p>
+            <a:pPr algn="ctr"/>
+            <a:r>
+              <a:rPr lang="es-MX" sz="2100" dirty="0" smtClean="0">
+                <a:latin typeface="Times New Roman" panose="02020603050405020304" pitchFamily="18" charset="0"/>
+                <a:cs typeface="Times New Roman" panose="02020603050405020304" pitchFamily="18" charset="0"/>
+              </a:rPr>
+              <a:t>“</a:t>
+            </a:r>
+            <a:r>
+              <a:rPr lang="es-MX" sz="2100" dirty="0" smtClean="0">
+                <a:latin typeface="Times New Roman" panose="02020603050405020304" pitchFamily="18" charset="0"/>
+                <a:cs typeface="Times New Roman" panose="02020603050405020304" pitchFamily="18" charset="0"/>
+              </a:rPr>
+              <a:t>No, </a:t>
+            </a:r>
+          </a:p>
+          <a:p>
+            <a:pPr algn="ctr"/>
+            <a:r>
+              <a:rPr lang="es-MX" sz="2100" dirty="0" smtClean="0">
+                <a:latin typeface="Times New Roman" panose="02020603050405020304" pitchFamily="18" charset="0"/>
+                <a:cs typeface="Times New Roman" panose="02020603050405020304" pitchFamily="18" charset="0"/>
+              </a:rPr>
+              <a:t> </a:t>
+            </a:r>
+            <a:r>
+              <a:rPr lang="es-MX" sz="2100" dirty="0" smtClean="0">
+                <a:latin typeface="Times New Roman" panose="02020603050405020304" pitchFamily="18" charset="0"/>
+                <a:cs typeface="Times New Roman" panose="02020603050405020304" pitchFamily="18" charset="0"/>
+              </a:rPr>
+              <a:t>no hay </a:t>
+            </a:r>
+            <a:r>
+              <a:rPr lang="es-MX" sz="2100" dirty="0" smtClean="0">
+                <a:latin typeface="Times New Roman" panose="02020603050405020304" pitchFamily="18" charset="0"/>
+                <a:cs typeface="Times New Roman" panose="02020603050405020304" pitchFamily="18" charset="0"/>
+              </a:rPr>
+              <a:t>señal”</a:t>
+            </a:r>
+            <a:endParaRPr lang="es-MX" sz="2100" dirty="0">
+              <a:latin typeface="Times New Roman" panose="02020603050405020304" pitchFamily="18" charset="0"/>
+              <a:cs typeface="Times New Roman" panose="02020603050405020304" pitchFamily="18" charset="0"/>
+            </a:endParaRPr>
+          </a:p>
+        </p:txBody>
+      </p:sp>
+      <p:sp>
+        <p:nvSpPr>
+          <p:cNvPr id="18" name="Rectángulo 17"/>
           <p:cNvSpPr/>
           <p:nvPr/>
         </p:nvSpPr>
         <p:spPr>
           <a:xfrm>
-            <a:off x="6581954" y="1772728"/>
-            <a:ext cx="3001992" cy="1733909"/>
+            <a:off x="4094672" y="3509963"/>
+            <a:ext cx="2487282" cy="1541797"/>
           </a:xfrm>
           <a:prstGeom prst="rect">
             <a:avLst/>
@@ -3100,20 +3438,56 @@
           <a:lstStyle/>
           <a:p>
             <a:pPr algn="ctr"/>
-            <a:endParaRPr lang="es-MX"/>
-          </a:p>
-        </p:txBody>
-      </p:sp>
-      <p:sp>
-        <p:nvSpPr>
-          <p:cNvPr id="6" name="Rectángulo 5"/>
+            <a:r>
+              <a:rPr lang="es-MX" sz="2200" b="1" dirty="0" smtClean="0">
+                <a:solidFill>
+                  <a:schemeClr val="accent3">
+                    <a:lumMod val="75000"/>
+                  </a:schemeClr>
+                </a:solidFill>
+              </a:rPr>
+              <a:t>Omisión</a:t>
+            </a:r>
+            <a:endParaRPr lang="es-MX" sz="2200" b="1" dirty="0" smtClean="0">
+              <a:solidFill>
+                <a:schemeClr val="accent3">
+                  <a:lumMod val="75000"/>
+                </a:schemeClr>
+              </a:solidFill>
+            </a:endParaRPr>
+          </a:p>
+          <a:p>
+            <a:pPr algn="ctr"/>
+            <a:r>
+              <a:rPr lang="es-MX" sz="2000" dirty="0" smtClean="0">
+                <a:solidFill>
+                  <a:schemeClr val="bg2">
+                    <a:lumMod val="50000"/>
+                  </a:schemeClr>
+                </a:solidFill>
+              </a:rPr>
+              <a:t>(Error)</a:t>
+            </a:r>
+            <a:endParaRPr lang="es-MX" sz="2000" dirty="0">
+              <a:solidFill>
+                <a:schemeClr val="bg2">
+                  <a:lumMod val="50000"/>
+                </a:schemeClr>
+              </a:solidFill>
+            </a:endParaRPr>
+          </a:p>
+        </p:txBody>
+      </p:sp>
+      <p:sp>
+        <p:nvSpPr>
+          <p:cNvPr id="19" name="Rectángulo 18"/>
           <p:cNvSpPr/>
           <p:nvPr/>
         </p:nvSpPr>
         <p:spPr>
           <a:xfrm>
-            <a:off x="3579962" y="3509963"/>
-            <a:ext cx="3001992" cy="1733909"/>
+            <a:off x="6581954" y="1965919"/>
+            <a:ext cx="2487282" cy="1541797"/>
           </a:xfrm>
           <a:prstGeom prst="rect">
             <a:avLst/>
@@ -3138,20 +3512,49 @@
           <a:lstStyle/>
           <a:p>
             <a:pPr algn="ctr"/>
-            <a:endParaRPr lang="es-MX"/>
-          </a:p>
-        </p:txBody>
-      </p:sp>
-      <p:sp>
-        <p:nvSpPr>
-          <p:cNvPr id="7" name="Rectángulo 6"/>
+            <a:r>
+              <a:rPr lang="es-MX" sz="2200" b="1" dirty="0" smtClean="0">
+                <a:solidFill>
+                  <a:schemeClr val="accent3">
+                    <a:lumMod val="75000"/>
+                  </a:schemeClr>
+                </a:solidFill>
+              </a:rPr>
+              <a:t>Falsa Alarma</a:t>
+            </a:r>
+          </a:p>
+          <a:p>
+            <a:pPr algn="ctr"/>
+            <a:r>
+              <a:rPr lang="es-MX" sz="2000" dirty="0" smtClean="0">
+                <a:solidFill>
+                  <a:schemeClr val="bg2">
+                    <a:lumMod val="50000"/>
+                  </a:schemeClr>
+                </a:solidFill>
+              </a:rPr>
+              <a:t>(Error)</a:t>
+            </a:r>
+            <a:endParaRPr lang="es-MX" sz="2000" dirty="0">
+              <a:solidFill>
+                <a:schemeClr val="bg2">
+                  <a:lumMod val="50000"/>
+                </a:schemeClr>
+              </a:solidFill>
+            </a:endParaRPr>
+          </a:p>
+        </p:txBody>
+      </p:sp>
+      <p:sp>
+        <p:nvSpPr>
+          <p:cNvPr id="20" name="Rectángulo 19"/>
           <p:cNvSpPr/>
           <p:nvPr/>
         </p:nvSpPr>
         <p:spPr>
           <a:xfrm>
-            <a:off x="6581954" y="3509963"/>
-            <a:ext cx="3001992" cy="1733909"/>
+            <a:off x="6581954" y="3503484"/>
+            <a:ext cx="2487282" cy="1541797"/>
           </a:xfrm>
           <a:prstGeom prst="rect">
             <a:avLst/>
@@ -3176,7 +3579,203 @@
           <a:lstStyle/>
           <a:p>
             <a:pPr algn="ctr"/>
-            <a:endParaRPr lang="es-MX"/>
+            <a:r>
+              <a:rPr lang="es-MX" sz="2200" b="1" dirty="0" smtClean="0">
+                <a:solidFill>
+                  <a:schemeClr val="accent3">
+                    <a:lumMod val="75000"/>
+                  </a:schemeClr>
+                </a:solidFill>
+              </a:rPr>
+              <a:t>Rechazo Correcto</a:t>
+            </a:r>
+          </a:p>
+          <a:p>
+            <a:pPr algn="ctr"/>
+            <a:r>
+              <a:rPr lang="es-MX" sz="2000" dirty="0" smtClean="0">
+                <a:solidFill>
+                  <a:schemeClr val="bg2">
+                    <a:lumMod val="50000"/>
+                  </a:schemeClr>
+                </a:solidFill>
+              </a:rPr>
+              <a:t>(Acierto)</a:t>
+            </a:r>
+            <a:endParaRPr lang="es-MX" sz="2000" dirty="0">
+              <a:solidFill>
+                <a:schemeClr val="bg2">
+                  <a:lumMod val="50000"/>
+                </a:schemeClr>
+              </a:solidFill>
+            </a:endParaRPr>
+          </a:p>
+        </p:txBody>
+      </p:sp>
+    </p:spTree>
+    <p:extLst>
+      <p:ext uri="{BB962C8B-B14F-4D97-AF65-F5344CB8AC3E}">
+        <p14:creationId xmlns:p14="http://schemas.microsoft.com/office/powerpoint/2010/main" val="3219205625"/>
+      </p:ext>
+    </p:extLst>
+  </p:cSld>
+  <p:clrMapOvr>
+    <a:masterClrMapping/>
+  </p:clrMapOvr>
+  <p:timing>
+    <p:tnLst>
+      <p:par>
+        <p:cTn id="1" dur="indefinite" restart="never" nodeType="tmRoot"/>
+      </p:par>
+    </p:tnLst>
+  </p:timing>
+</p:sld>
+</file>
+
+<file path=ppt/slides/slide2.xml><?xml version="1.0" encoding="utf-8"?>
+<p:sld xmlns:a="http://schemas.openxmlformats.org/drawingml/2006/main" xmlns:r="http://schemas.openxmlformats.org/officeDocument/2006/relationships" xmlns:p="http://schemas.openxmlformats.org/presentationml/2006/main">
+  <p:cSld>
+    <p:spTree>
+      <p:nvGrpSpPr>
+        <p:cNvPr id="1" name=""/>
+        <p:cNvGrpSpPr/>
+        <p:nvPr/>
+      </p:nvGrpSpPr>
+      <p:grpSpPr>
+        <a:xfrm>
+          <a:off x="0" y="0"/>
+          <a:ext cx="0" cy="0"/>
+          <a:chOff x="0" y="0"/>
+          <a:chExt cx="0" cy="0"/>
+        </a:xfrm>
+      </p:grpSpPr>
+      <p:sp>
+        <p:nvSpPr>
+          <p:cNvPr id="2" name="Título 1"/>
+          <p:cNvSpPr>
+            <a:spLocks noGrp="1"/>
+          </p:cNvSpPr>
+          <p:nvPr>
+            <p:ph type="ctrTitle"/>
+          </p:nvPr>
+        </p:nvSpPr>
+        <p:spPr>
+          <a:xfrm>
+            <a:off x="1687773" y="1030752"/>
+            <a:ext cx="9144000" cy="2387600"/>
+          </a:xfrm>
+        </p:spPr>
+        <p:txBody>
+          <a:bodyPr/>
+          <a:lstStyle/>
+          <a:p>
+            <a:r>
+              <a:rPr lang="es-MX" dirty="0" smtClean="0"/>
+              <a:t/>
+            </a:r>
+            <a:br>
+              <a:rPr lang="es-MX" dirty="0" smtClean="0"/>
+            </a:br>
+            <a:endParaRPr lang="es-MX" dirty="0"/>
+          </a:p>
+        </p:txBody>
+      </p:sp>
+      <p:sp>
+        <p:nvSpPr>
+          <p:cNvPr id="3" name="Subtítulo 2"/>
+          <p:cNvSpPr>
+            <a:spLocks noGrp="1"/>
+          </p:cNvSpPr>
+          <p:nvPr>
+            <p:ph type="subTitle" idx="1"/>
+          </p:nvPr>
+        </p:nvSpPr>
+        <p:spPr/>
+        <p:txBody>
+          <a:bodyPr/>
+          <a:lstStyle/>
+          <a:p>
+            <a:endParaRPr lang="es-MX" dirty="0" smtClean="0"/>
+          </a:p>
+          <a:p>
+            <a:endParaRPr lang="es-MX" dirty="0"/>
+          </a:p>
+        </p:txBody>
+      </p:sp>
+      <p:sp>
+        <p:nvSpPr>
+          <p:cNvPr id="4" name="Rectángulo 3"/>
+          <p:cNvSpPr/>
+          <p:nvPr/>
+        </p:nvSpPr>
+        <p:spPr>
+          <a:xfrm>
+            <a:off x="3794078" y="1749781"/>
+            <a:ext cx="2787876" cy="1753704"/>
+          </a:xfrm>
+          <a:prstGeom prst="rect">
+            <a:avLst/>
+          </a:prstGeom>
+        </p:spPr>
+        <p:style>
+          <a:lnRef idx="2">
+            <a:schemeClr val="dk1"/>
+          </a:lnRef>
+          <a:fillRef idx="1">
+            <a:schemeClr val="lt1"/>
+          </a:fillRef>
+          <a:effectRef idx="0">
+            <a:schemeClr val="dk1"/>
+          </a:effectRef>
+          <a:fontRef idx="minor">
+            <a:schemeClr val="dk1"/>
+          </a:fontRef>
+        </p:style>
+        <p:txBody>
+          <a:bodyPr rtlCol="0" anchor="ctr"/>
+          <a:lstStyle/>
+          <a:p>
+            <a:pPr algn="ctr"/>
+            <a:r>
+              <a:rPr lang="es-MX" sz="2200" b="1" dirty="0" smtClean="0">
+                <a:solidFill>
+                  <a:schemeClr val="bg2">
+                    <a:lumMod val="50000"/>
+                  </a:schemeClr>
+                </a:solidFill>
+              </a:rPr>
+              <a:t>Hit</a:t>
+            </a:r>
+          </a:p>
+          <a:p>
+            <a:pPr algn="ctr"/>
+            <a:r>
+              <a:rPr lang="es-MX" sz="2000" u="sng" dirty="0" smtClean="0">
+                <a:solidFill>
+                  <a:schemeClr val="accent6">
+                    <a:lumMod val="75000"/>
+                  </a:schemeClr>
+                </a:solidFill>
+              </a:rPr>
+              <a:t>Ganancia:</a:t>
+            </a:r>
+            <a:r>
+              <a:rPr lang="es-MX" sz="2000" dirty="0" smtClean="0">
+                <a:solidFill>
+                  <a:schemeClr val="accent6">
+                    <a:lumMod val="75000"/>
+                  </a:schemeClr>
+                </a:solidFill>
+              </a:rPr>
+              <a:t> Poder correr y escapar a tiempo.</a:t>
+            </a:r>
+            <a:endParaRPr lang="es-MX" sz="2000" dirty="0">
+              <a:solidFill>
+                <a:schemeClr val="accent6">
+                  <a:lumMod val="75000"/>
+                </a:schemeClr>
+              </a:solidFill>
+            </a:endParaRPr>
           </a:p>
         </p:txBody>
       </p:sp>
@@ -3188,8 +3787,8 @@
         </p:nvSpPr>
         <p:spPr>
           <a:xfrm>
-            <a:off x="5080958" y="612514"/>
-            <a:ext cx="3571336" cy="369332"/>
+            <a:off x="4796286" y="506171"/>
+            <a:ext cx="3571336" cy="477054"/>
           </a:xfrm>
           <a:prstGeom prst="rect">
             <a:avLst/>
@@ -3204,13 +3803,34 @@
           <a:p>
             <a:pPr algn="ctr"/>
             <a:r>
-              <a:rPr lang="es-MX" b="1" dirty="0" smtClean="0">
+              <a:rPr lang="es-MX" sz="2500" b="1" dirty="0" smtClean="0">
                 <a:latin typeface="Times New Roman" panose="02020603050405020304" pitchFamily="18" charset="0"/>
                 <a:cs typeface="Times New Roman" panose="02020603050405020304" pitchFamily="18" charset="0"/>
               </a:rPr>
-              <a:t>El estado del mundo</a:t>
-            </a:r>
-            <a:endParaRPr lang="es-MX" b="1" dirty="0">
+              <a:t>Estado </a:t>
+            </a:r>
+            <a:r>
+              <a:rPr lang="es-MX" sz="2500" b="1" dirty="0" smtClean="0">
+                <a:latin typeface="Times New Roman" panose="02020603050405020304" pitchFamily="18" charset="0"/>
+                <a:cs typeface="Times New Roman" panose="02020603050405020304" pitchFamily="18" charset="0"/>
+              </a:rPr>
+              <a:t>real </a:t>
+            </a:r>
+            <a:r>
+              <a:rPr lang="es-MX" sz="2500" b="1" dirty="0" smtClean="0">
+                <a:latin typeface="Times New Roman" panose="02020603050405020304" pitchFamily="18" charset="0"/>
+                <a:cs typeface="Times New Roman" panose="02020603050405020304" pitchFamily="18" charset="0"/>
+              </a:rPr>
+              <a:t>del </a:t>
+            </a:r>
+            <a:r>
+              <a:rPr lang="es-MX" sz="2500" b="1" dirty="0" smtClean="0">
+                <a:latin typeface="Times New Roman" panose="02020603050405020304" pitchFamily="18" charset="0"/>
+                <a:cs typeface="Times New Roman" panose="02020603050405020304" pitchFamily="18" charset="0"/>
+              </a:rPr>
+              <a:t>mundo</a:t>
+            </a:r>
+            <a:endParaRPr lang="es-MX" sz="2500" b="1" dirty="0">
               <a:latin typeface="Times New Roman" panose="02020603050405020304" pitchFamily="18" charset="0"/>
               <a:cs typeface="Times New Roman" panose="02020603050405020304" pitchFamily="18" charset="0"/>
             </a:endParaRPr>
@@ -3225,8 +3845,8 @@
         </p:nvSpPr>
         <p:spPr>
           <a:xfrm rot="16200000">
-            <a:off x="577333" y="3417372"/>
-            <a:ext cx="3571336" cy="369332"/>
+            <a:off x="792489" y="3284688"/>
+            <a:ext cx="3571336" cy="477054"/>
           </a:xfrm>
           <a:prstGeom prst="rect">
             <a:avLst/>
@@ -3241,13 +3861,13 @@
           <a:p>
             <a:pPr algn="ctr"/>
             <a:r>
-              <a:rPr lang="es-MX" b="1" dirty="0" smtClean="0">
+              <a:rPr lang="es-MX" sz="2500" b="1" dirty="0" smtClean="0">
                 <a:latin typeface="Times New Roman" panose="02020603050405020304" pitchFamily="18" charset="0"/>
                 <a:cs typeface="Times New Roman" panose="02020603050405020304" pitchFamily="18" charset="0"/>
               </a:rPr>
-              <a:t>La decisión  del mundo</a:t>
-            </a:r>
-            <a:endParaRPr lang="es-MX" b="1" dirty="0">
+              <a:t>Juicio de detección</a:t>
+            </a:r>
+            <a:endParaRPr lang="es-MX" sz="2500" b="1" dirty="0">
               <a:latin typeface="Times New Roman" panose="02020603050405020304" pitchFamily="18" charset="0"/>
               <a:cs typeface="Times New Roman" panose="02020603050405020304" pitchFamily="18" charset="0"/>
             </a:endParaRPr>
@@ -3262,8 +3882,8 @@
         </p:nvSpPr>
         <p:spPr>
           <a:xfrm>
-            <a:off x="4295954" y="1357359"/>
-            <a:ext cx="2467155" cy="369332"/>
+            <a:off x="3954438" y="1080029"/>
+            <a:ext cx="2467155" cy="723275"/>
           </a:xfrm>
           <a:prstGeom prst="rect">
             <a:avLst/>
@@ -3276,14 +3896,25 @@
           </a:bodyPr>
           <a:lstStyle/>
           <a:p>
-            <a:r>
-              <a:rPr lang="es-MX" dirty="0" smtClean="0">
+            <a:pPr algn="ctr"/>
+            <a:r>
+              <a:rPr lang="es-MX" sz="2100" dirty="0" smtClean="0">
                 <a:latin typeface="Times New Roman" panose="02020603050405020304" pitchFamily="18" charset="0"/>
                 <a:cs typeface="Times New Roman" panose="02020603050405020304" pitchFamily="18" charset="0"/>
               </a:rPr>
-              <a:t>         Señal</a:t>
-            </a:r>
-            <a:endParaRPr lang="es-MX" dirty="0">
+              <a:t>Señal </a:t>
+            </a:r>
+          </a:p>
+          <a:p>
+            <a:pPr algn="ctr"/>
+            <a:r>
+              <a:rPr lang="es-MX" sz="2000" i="1" dirty="0" smtClean="0">
+                <a:latin typeface="Times New Roman" panose="02020603050405020304" pitchFamily="18" charset="0"/>
+                <a:cs typeface="Times New Roman" panose="02020603050405020304" pitchFamily="18" charset="0"/>
+              </a:rPr>
+              <a:t>(Depredador)</a:t>
+            </a:r>
+            <a:endParaRPr lang="es-MX" sz="2000" i="1" dirty="0">
               <a:latin typeface="Times New Roman" panose="02020603050405020304" pitchFamily="18" charset="0"/>
               <a:cs typeface="Times New Roman" panose="02020603050405020304" pitchFamily="18" charset="0"/>
             </a:endParaRPr>
@@ -3298,8 +3929,8 @@
         </p:nvSpPr>
         <p:spPr>
           <a:xfrm>
-            <a:off x="6978768" y="1366601"/>
-            <a:ext cx="2467155" cy="369332"/>
+            <a:off x="6731757" y="1236916"/>
+            <a:ext cx="2467155" cy="415498"/>
           </a:xfrm>
           <a:prstGeom prst="rect">
             <a:avLst/>
@@ -3313,13 +3944,13 @@
           <a:lstStyle/>
           <a:p>
             <a:r>
-              <a:rPr lang="es-MX" dirty="0" smtClean="0">
+              <a:rPr lang="es-MX" sz="2100" dirty="0" smtClean="0">
                 <a:latin typeface="Times New Roman" panose="02020603050405020304" pitchFamily="18" charset="0"/>
                 <a:cs typeface="Times New Roman" panose="02020603050405020304" pitchFamily="18" charset="0"/>
               </a:rPr>
               <a:t>             Ruido</a:t>
             </a:r>
-            <a:endParaRPr lang="es-MX" dirty="0">
+            <a:endParaRPr lang="es-MX" sz="2100" dirty="0">
               <a:latin typeface="Times New Roman" panose="02020603050405020304" pitchFamily="18" charset="0"/>
               <a:cs typeface="Times New Roman" panose="02020603050405020304" pitchFamily="18" charset="0"/>
             </a:endParaRPr>
@@ -3334,8 +3965,8 @@
         </p:nvSpPr>
         <p:spPr>
           <a:xfrm rot="16200000">
-            <a:off x="2410905" y="4148940"/>
-            <a:ext cx="1820531" cy="369332"/>
+            <a:off x="2334779" y="2223885"/>
+            <a:ext cx="1820531" cy="738664"/>
           </a:xfrm>
           <a:prstGeom prst="rect">
             <a:avLst/>
@@ -3348,14 +3979,29 @@
           </a:bodyPr>
           <a:lstStyle/>
           <a:p>
-            <a:r>
-              <a:rPr lang="es-MX" dirty="0" smtClean="0">
+            <a:pPr algn="ctr"/>
+            <a:r>
+              <a:rPr lang="es-MX" sz="2100" dirty="0" smtClean="0">
                 <a:latin typeface="Times New Roman" panose="02020603050405020304" pitchFamily="18" charset="0"/>
                 <a:cs typeface="Times New Roman" panose="02020603050405020304" pitchFamily="18" charset="0"/>
               </a:rPr>
-              <a:t>‘Sí, la señal está’</a:t>
-            </a:r>
-            <a:endParaRPr lang="es-MX" dirty="0">
+              <a:t>“¡Sí</a:t>
+            </a:r>
+            <a:r>
+              <a:rPr lang="es-MX" sz="2100" dirty="0" smtClean="0">
+                <a:latin typeface="Times New Roman" panose="02020603050405020304" pitchFamily="18" charset="0"/>
+                <a:cs typeface="Times New Roman" panose="02020603050405020304" pitchFamily="18" charset="0"/>
+              </a:rPr>
+              <a:t>, </a:t>
+            </a:r>
+            <a:r>
+              <a:rPr lang="es-MX" sz="2100" dirty="0" smtClean="0">
+                <a:latin typeface="Times New Roman" panose="02020603050405020304" pitchFamily="18" charset="0"/>
+                <a:cs typeface="Times New Roman" panose="02020603050405020304" pitchFamily="18" charset="0"/>
+              </a:rPr>
+              <a:t> es un depredador!”</a:t>
+            </a:r>
+            <a:endParaRPr lang="es-MX" sz="2100" dirty="0">
               <a:latin typeface="Times New Roman" panose="02020603050405020304" pitchFamily="18" charset="0"/>
               <a:cs typeface="Times New Roman" panose="02020603050405020304" pitchFamily="18" charset="0"/>
             </a:endParaRPr>
@@ -3370,8 +4016,8 @@
         </p:nvSpPr>
         <p:spPr>
           <a:xfrm rot="16200000">
-            <a:off x="2383426" y="2381074"/>
-            <a:ext cx="1875488" cy="369332"/>
+            <a:off x="2408953" y="3988180"/>
+            <a:ext cx="1708059" cy="738664"/>
           </a:xfrm>
           <a:prstGeom prst="rect">
             <a:avLst/>
@@ -3384,14 +4030,22 @@
           </a:bodyPr>
           <a:lstStyle/>
           <a:p>
-            <a:r>
-              <a:rPr lang="es-MX" dirty="0" smtClean="0">
+            <a:pPr algn="ctr"/>
+            <a:r>
+              <a:rPr lang="es-MX" sz="2100" dirty="0" smtClean="0">
                 <a:latin typeface="Times New Roman" panose="02020603050405020304" pitchFamily="18" charset="0"/>
                 <a:cs typeface="Times New Roman" panose="02020603050405020304" pitchFamily="18" charset="0"/>
               </a:rPr>
-              <a:t>‘No, no hay señal’</a:t>
-            </a:r>
-            <a:endParaRPr lang="es-MX" dirty="0">
+              <a:t>“</a:t>
+            </a:r>
+            <a:r>
+              <a:rPr lang="es-MX" sz="2100" dirty="0" smtClean="0">
+                <a:latin typeface="Times New Roman" panose="02020603050405020304" pitchFamily="18" charset="0"/>
+                <a:cs typeface="Times New Roman" panose="02020603050405020304" pitchFamily="18" charset="0"/>
+              </a:rPr>
+              <a:t>No, debió ser otra cosa”</a:t>
+            </a:r>
+            <a:endParaRPr lang="es-MX" sz="2100" dirty="0">
               <a:latin typeface="Times New Roman" panose="02020603050405020304" pitchFamily="18" charset="0"/>
               <a:cs typeface="Times New Roman" panose="02020603050405020304" pitchFamily="18" charset="0"/>
             </a:endParaRPr>
@@ -3400,148 +4054,219 @@
       </p:sp>
       <p:sp>
         <p:nvSpPr>
-          <p:cNvPr id="14" name="CuadroTexto 13"/>
-          <p:cNvSpPr txBox="1"/>
+          <p:cNvPr id="18" name="Rectángulo 17"/>
+          <p:cNvSpPr/>
           <p:nvPr/>
         </p:nvSpPr>
         <p:spPr>
           <a:xfrm>
-            <a:off x="3726611" y="4157175"/>
-            <a:ext cx="2708694" cy="369332"/>
+            <a:off x="3794078" y="3503482"/>
+            <a:ext cx="2787876" cy="1817635"/>
           </a:xfrm>
           <a:prstGeom prst="rect">
             <a:avLst/>
           </a:prstGeom>
-          <a:noFill/>
         </p:spPr>
-        <p:txBody>
-          <a:bodyPr wrap="square" rtlCol="0">
-            <a:spAutoFit/>
-          </a:bodyPr>
+        <p:style>
+          <a:lnRef idx="2">
+            <a:schemeClr val="dk1"/>
+          </a:lnRef>
+          <a:fillRef idx="1">
+            <a:schemeClr val="lt1"/>
+          </a:fillRef>
+          <a:effectRef idx="0">
+            <a:schemeClr val="dk1"/>
+          </a:effectRef>
+          <a:fontRef idx="minor">
+            <a:schemeClr val="dk1"/>
+          </a:fontRef>
+        </p:style>
+        <p:txBody>
+          <a:bodyPr rtlCol="0" anchor="ctr"/>
           <a:lstStyle/>
           <a:p>
             <a:pPr algn="ctr"/>
             <a:r>
-              <a:rPr lang="es-MX" dirty="0" smtClean="0">
-                <a:latin typeface="Times New Roman" panose="02020603050405020304" pitchFamily="18" charset="0"/>
-                <a:cs typeface="Times New Roman" panose="02020603050405020304" pitchFamily="18" charset="0"/>
-              </a:rPr>
-              <a:t>Hit</a:t>
-            </a:r>
-            <a:endParaRPr lang="es-MX" dirty="0">
-              <a:latin typeface="Times New Roman" panose="02020603050405020304" pitchFamily="18" charset="0"/>
-              <a:cs typeface="Times New Roman" panose="02020603050405020304" pitchFamily="18" charset="0"/>
+              <a:rPr lang="es-MX" sz="2200" b="1" dirty="0" smtClean="0">
+                <a:solidFill>
+                  <a:schemeClr val="bg2">
+                    <a:lumMod val="50000"/>
+                  </a:schemeClr>
+                </a:solidFill>
+              </a:rPr>
+              <a:t>Omisión</a:t>
+            </a:r>
+          </a:p>
+          <a:p>
+            <a:pPr algn="ctr"/>
+            <a:r>
+              <a:rPr lang="es-MX" sz="2000" u="sng" dirty="0" smtClean="0">
+                <a:solidFill>
+                  <a:srgbClr val="C00000"/>
+                </a:solidFill>
+              </a:rPr>
+              <a:t>Costo:</a:t>
+            </a:r>
+            <a:r>
+              <a:rPr lang="es-MX" sz="2000" dirty="0" smtClean="0">
+                <a:solidFill>
+                  <a:srgbClr val="C00000"/>
+                </a:solidFill>
+              </a:rPr>
+              <a:t> ¡La muerte! </a:t>
+            </a:r>
+            <a:endParaRPr lang="es-MX" sz="2000" dirty="0">
+              <a:solidFill>
+                <a:srgbClr val="C00000"/>
+              </a:solidFill>
             </a:endParaRPr>
           </a:p>
         </p:txBody>
       </p:sp>
       <p:sp>
         <p:nvSpPr>
-          <p:cNvPr id="15" name="CuadroTexto 14"/>
-          <p:cNvSpPr txBox="1"/>
+          <p:cNvPr id="19" name="Rectángulo 18"/>
+          <p:cNvSpPr/>
           <p:nvPr/>
         </p:nvSpPr>
         <p:spPr>
           <a:xfrm>
-            <a:off x="3713990" y="2316163"/>
-            <a:ext cx="2708694" cy="369332"/>
+            <a:off x="6581954" y="1750967"/>
+            <a:ext cx="2766762" cy="1756750"/>
           </a:xfrm>
           <a:prstGeom prst="rect">
             <a:avLst/>
           </a:prstGeom>
-          <a:noFill/>
         </p:spPr>
-        <p:txBody>
-          <a:bodyPr wrap="square" rtlCol="0">
-            <a:spAutoFit/>
-          </a:bodyPr>
+        <p:style>
+          <a:lnRef idx="2">
+            <a:schemeClr val="dk1"/>
+          </a:lnRef>
+          <a:fillRef idx="1">
+            <a:schemeClr val="lt1"/>
+          </a:fillRef>
+          <a:effectRef idx="0">
+            <a:schemeClr val="dk1"/>
+          </a:effectRef>
+          <a:fontRef idx="minor">
+            <a:schemeClr val="dk1"/>
+          </a:fontRef>
+        </p:style>
+        <p:txBody>
+          <a:bodyPr rtlCol="0" anchor="ctr"/>
           <a:lstStyle/>
           <a:p>
             <a:pPr algn="ctr"/>
             <a:r>
-              <a:rPr lang="es-MX" dirty="0" smtClean="0">
-                <a:latin typeface="Times New Roman" panose="02020603050405020304" pitchFamily="18" charset="0"/>
-                <a:cs typeface="Times New Roman" panose="02020603050405020304" pitchFamily="18" charset="0"/>
-              </a:rPr>
-              <a:t>Omisión</a:t>
-            </a:r>
-            <a:endParaRPr lang="es-MX" dirty="0">
-              <a:latin typeface="Times New Roman" panose="02020603050405020304" pitchFamily="18" charset="0"/>
-              <a:cs typeface="Times New Roman" panose="02020603050405020304" pitchFamily="18" charset="0"/>
+              <a:rPr lang="es-MX" sz="2200" b="1" dirty="0" smtClean="0">
+                <a:solidFill>
+                  <a:schemeClr val="bg2">
+                    <a:lumMod val="50000"/>
+                  </a:schemeClr>
+                </a:solidFill>
+              </a:rPr>
+              <a:t>Falsa Alarma</a:t>
+            </a:r>
+          </a:p>
+          <a:p>
+            <a:pPr algn="ctr"/>
+            <a:r>
+              <a:rPr lang="es-MX" sz="2000" u="sng" dirty="0" smtClean="0">
+                <a:solidFill>
+                  <a:srgbClr val="C00000"/>
+                </a:solidFill>
+              </a:rPr>
+              <a:t>Costo:</a:t>
+            </a:r>
+            <a:r>
+              <a:rPr lang="es-MX" sz="2000" dirty="0" smtClean="0">
+                <a:solidFill>
+                  <a:srgbClr val="C00000"/>
+                </a:solidFill>
+              </a:rPr>
+              <a:t> Gasto innecesario de energía</a:t>
+            </a:r>
+            <a:endParaRPr lang="es-MX" sz="2000" dirty="0">
+              <a:solidFill>
+                <a:srgbClr val="C00000"/>
+              </a:solidFill>
             </a:endParaRPr>
           </a:p>
         </p:txBody>
       </p:sp>
       <p:sp>
         <p:nvSpPr>
-          <p:cNvPr id="16" name="CuadroTexto 15"/>
-          <p:cNvSpPr txBox="1"/>
+          <p:cNvPr id="20" name="Rectángulo 19"/>
+          <p:cNvSpPr/>
           <p:nvPr/>
         </p:nvSpPr>
         <p:spPr>
           <a:xfrm>
-            <a:off x="6678284" y="4076910"/>
-            <a:ext cx="2708694" cy="369332"/>
+            <a:off x="6581954" y="3503484"/>
+            <a:ext cx="2766762" cy="1817633"/>
           </a:xfrm>
           <a:prstGeom prst="rect">
             <a:avLst/>
           </a:prstGeom>
-          <a:noFill/>
         </p:spPr>
-        <p:txBody>
-          <a:bodyPr wrap="square" rtlCol="0">
-            <a:spAutoFit/>
-          </a:bodyPr>
+        <p:style>
+          <a:lnRef idx="2">
+            <a:schemeClr val="dk1"/>
+          </a:lnRef>
+          <a:fillRef idx="1">
+            <a:schemeClr val="lt1"/>
+          </a:fillRef>
+          <a:effectRef idx="0">
+            <a:schemeClr val="dk1"/>
+          </a:effectRef>
+          <a:fontRef idx="minor">
+            <a:schemeClr val="dk1"/>
+          </a:fontRef>
+        </p:style>
+        <p:txBody>
+          <a:bodyPr rtlCol="0" anchor="ctr"/>
           <a:lstStyle/>
           <a:p>
             <a:pPr algn="ctr"/>
             <a:r>
-              <a:rPr lang="es-MX" dirty="0" smtClean="0">
-                <a:latin typeface="Times New Roman" panose="02020603050405020304" pitchFamily="18" charset="0"/>
-                <a:cs typeface="Times New Roman" panose="02020603050405020304" pitchFamily="18" charset="0"/>
-              </a:rPr>
-              <a:t>Falsa Alarma</a:t>
-            </a:r>
-            <a:endParaRPr lang="es-MX" dirty="0">
-              <a:latin typeface="Times New Roman" panose="02020603050405020304" pitchFamily="18" charset="0"/>
-              <a:cs typeface="Times New Roman" panose="02020603050405020304" pitchFamily="18" charset="0"/>
-            </a:endParaRPr>
-          </a:p>
-        </p:txBody>
-      </p:sp>
-      <p:sp>
-        <p:nvSpPr>
-          <p:cNvPr id="17" name="CuadroTexto 16"/>
-          <p:cNvSpPr txBox="1"/>
-          <p:nvPr/>
-        </p:nvSpPr>
-        <p:spPr>
-          <a:xfrm>
-            <a:off x="6741224" y="2316163"/>
-            <a:ext cx="2708694" cy="369332"/>
-          </a:xfrm>
-          <a:prstGeom prst="rect">
-            <a:avLst/>
-          </a:prstGeom>
-          <a:noFill/>
-        </p:spPr>
-        <p:txBody>
-          <a:bodyPr wrap="square" rtlCol="0">
-            <a:spAutoFit/>
-          </a:bodyPr>
-          <a:lstStyle/>
+              <a:rPr lang="es-MX" sz="2200" b="1" dirty="0" smtClean="0">
+                <a:solidFill>
+                  <a:schemeClr val="bg2">
+                    <a:lumMod val="50000"/>
+                  </a:schemeClr>
+                </a:solidFill>
+              </a:rPr>
+              <a:t>Rechazo Correcto</a:t>
+            </a:r>
+          </a:p>
           <a:p>
             <a:pPr algn="ctr"/>
             <a:r>
-              <a:rPr lang="es-MX" dirty="0" smtClean="0">
-                <a:latin typeface="Times New Roman" panose="02020603050405020304" pitchFamily="18" charset="0"/>
-                <a:cs typeface="Times New Roman" panose="02020603050405020304" pitchFamily="18" charset="0"/>
-              </a:rPr>
-              <a:t>Rechazo Correcto</a:t>
-            </a:r>
-            <a:endParaRPr lang="es-MX" dirty="0">
-              <a:latin typeface="Times New Roman" panose="02020603050405020304" pitchFamily="18" charset="0"/>
-              <a:cs typeface="Times New Roman" panose="02020603050405020304" pitchFamily="18" charset="0"/>
+              <a:rPr lang="es-MX" sz="2000" u="sng" dirty="0" smtClean="0">
+                <a:solidFill>
+                  <a:schemeClr val="accent6">
+                    <a:lumMod val="75000"/>
+                  </a:schemeClr>
+                </a:solidFill>
+              </a:rPr>
+              <a:t>Ganancia:</a:t>
+            </a:r>
+            <a:r>
+              <a:rPr lang="es-MX" sz="2000" dirty="0" smtClean="0">
+                <a:solidFill>
+                  <a:schemeClr val="accent6">
+                    <a:lumMod val="75000"/>
+                  </a:schemeClr>
+                </a:solidFill>
+              </a:rPr>
+              <a:t> Poder continuar con sus actividades </a:t>
+            </a:r>
+            <a:endParaRPr lang="es-MX" sz="2000" dirty="0">
+              <a:solidFill>
+                <a:schemeClr val="accent6">
+                  <a:lumMod val="75000"/>
+                </a:schemeClr>
+              </a:solidFill>
             </a:endParaRPr>
           </a:p>
         </p:txBody>
@@ -3549,7 +4274,7 @@
     </p:spTree>
     <p:extLst>
       <p:ext uri="{BB962C8B-B14F-4D97-AF65-F5344CB8AC3E}">
-        <p14:creationId xmlns:p14="http://schemas.microsoft.com/office/powerpoint/2010/main" val="3219205625"/>
+        <p14:creationId xmlns:p14="http://schemas.microsoft.com/office/powerpoint/2010/main" val="3966155208"/>
       </p:ext>
     </p:extLst>
   </p:cSld>

</xml_diff>

<commit_message>
Escala de Confianza y 2AFC
</commit_message>
<xml_diff>
--- a/Tesis/Tesis Convencional/PP_ConstruyendoAmano.pptx
+++ b/Tesis/Tesis Convencional/PP_ConstruyendoAmano.pptx
@@ -7,6 +7,7 @@
   <p:sldIdLst>
     <p:sldId id="256" r:id="rId2"/>
     <p:sldId id="257" r:id="rId3"/>
+    <p:sldId id="258" r:id="rId4"/>
   </p:sldIdLst>
   <p:sldSz cx="12192000" cy="6858000"/>
   <p:notesSz cx="6858000" cy="9144000"/>
@@ -255,7 +256,7 @@
           <a:p>
             <a:fld id="{DE1850C6-5651-466F-AE95-2FBC276BA210}" type="datetimeFigureOut">
               <a:rPr lang="es-MX" smtClean="0"/>
-              <a:t>20/07/2017</a:t>
+              <a:t>27/07/2017</a:t>
             </a:fld>
             <a:endParaRPr lang="es-MX"/>
           </a:p>
@@ -425,7 +426,7 @@
           <a:p>
             <a:fld id="{DE1850C6-5651-466F-AE95-2FBC276BA210}" type="datetimeFigureOut">
               <a:rPr lang="es-MX" smtClean="0"/>
-              <a:t>20/07/2017</a:t>
+              <a:t>27/07/2017</a:t>
             </a:fld>
             <a:endParaRPr lang="es-MX"/>
           </a:p>
@@ -605,7 +606,7 @@
           <a:p>
             <a:fld id="{DE1850C6-5651-466F-AE95-2FBC276BA210}" type="datetimeFigureOut">
               <a:rPr lang="es-MX" smtClean="0"/>
-              <a:t>20/07/2017</a:t>
+              <a:t>27/07/2017</a:t>
             </a:fld>
             <a:endParaRPr lang="es-MX"/>
           </a:p>
@@ -775,7 +776,7 @@
           <a:p>
             <a:fld id="{DE1850C6-5651-466F-AE95-2FBC276BA210}" type="datetimeFigureOut">
               <a:rPr lang="es-MX" smtClean="0"/>
-              <a:t>20/07/2017</a:t>
+              <a:t>27/07/2017</a:t>
             </a:fld>
             <a:endParaRPr lang="es-MX"/>
           </a:p>
@@ -1021,7 +1022,7 @@
           <a:p>
             <a:fld id="{DE1850C6-5651-466F-AE95-2FBC276BA210}" type="datetimeFigureOut">
               <a:rPr lang="es-MX" smtClean="0"/>
-              <a:t>20/07/2017</a:t>
+              <a:t>27/07/2017</a:t>
             </a:fld>
             <a:endParaRPr lang="es-MX"/>
           </a:p>
@@ -1253,7 +1254,7 @@
           <a:p>
             <a:fld id="{DE1850C6-5651-466F-AE95-2FBC276BA210}" type="datetimeFigureOut">
               <a:rPr lang="es-MX" smtClean="0"/>
-              <a:t>20/07/2017</a:t>
+              <a:t>27/07/2017</a:t>
             </a:fld>
             <a:endParaRPr lang="es-MX"/>
           </a:p>
@@ -1620,7 +1621,7 @@
           <a:p>
             <a:fld id="{DE1850C6-5651-466F-AE95-2FBC276BA210}" type="datetimeFigureOut">
               <a:rPr lang="es-MX" smtClean="0"/>
-              <a:t>20/07/2017</a:t>
+              <a:t>27/07/2017</a:t>
             </a:fld>
             <a:endParaRPr lang="es-MX"/>
           </a:p>
@@ -1738,7 +1739,7 @@
           <a:p>
             <a:fld id="{DE1850C6-5651-466F-AE95-2FBC276BA210}" type="datetimeFigureOut">
               <a:rPr lang="es-MX" smtClean="0"/>
-              <a:t>20/07/2017</a:t>
+              <a:t>27/07/2017</a:t>
             </a:fld>
             <a:endParaRPr lang="es-MX"/>
           </a:p>
@@ -1833,7 +1834,7 @@
           <a:p>
             <a:fld id="{DE1850C6-5651-466F-AE95-2FBC276BA210}" type="datetimeFigureOut">
               <a:rPr lang="es-MX" smtClean="0"/>
-              <a:t>20/07/2017</a:t>
+              <a:t>27/07/2017</a:t>
             </a:fld>
             <a:endParaRPr lang="es-MX"/>
           </a:p>
@@ -2110,7 +2111,7 @@
           <a:p>
             <a:fld id="{DE1850C6-5651-466F-AE95-2FBC276BA210}" type="datetimeFigureOut">
               <a:rPr lang="es-MX" smtClean="0"/>
-              <a:t>20/07/2017</a:t>
+              <a:t>27/07/2017</a:t>
             </a:fld>
             <a:endParaRPr lang="es-MX"/>
           </a:p>
@@ -2363,7 +2364,7 @@
           <a:p>
             <a:fld id="{DE1850C6-5651-466F-AE95-2FBC276BA210}" type="datetimeFigureOut">
               <a:rPr lang="es-MX" smtClean="0"/>
-              <a:t>20/07/2017</a:t>
+              <a:t>27/07/2017</a:t>
             </a:fld>
             <a:endParaRPr lang="es-MX"/>
           </a:p>
@@ -2576,7 +2577,7 @@
           <a:p>
             <a:fld id="{DE1850C6-5651-466F-AE95-2FBC276BA210}" type="datetimeFigureOut">
               <a:rPr lang="es-MX" smtClean="0"/>
-              <a:t>20/07/2017</a:t>
+              <a:t>27/07/2017</a:t>
             </a:fld>
             <a:endParaRPr lang="es-MX"/>
           </a:p>
@@ -3078,13 +3079,6 @@
               </a:rPr>
               <a:t>Hit</a:t>
             </a:r>
-            <a:endParaRPr lang="es-MX" sz="2200" b="1" dirty="0" smtClean="0">
-              <a:solidFill>
-                <a:schemeClr val="accent3">
-                  <a:lumMod val="75000"/>
-                </a:schemeClr>
-              </a:solidFill>
-            </a:endParaRPr>
           </a:p>
           <a:p>
             <a:pPr algn="ctr"/>
@@ -3136,28 +3130,7 @@
                 <a:latin typeface="Times New Roman" panose="02020603050405020304" pitchFamily="18" charset="0"/>
                 <a:cs typeface="Times New Roman" panose="02020603050405020304" pitchFamily="18" charset="0"/>
               </a:rPr>
-              <a:t>Estado </a:t>
-            </a:r>
-            <a:r>
-              <a:rPr lang="es-MX" sz="2500" b="1" dirty="0" smtClean="0">
-                <a:latin typeface="Times New Roman" panose="02020603050405020304" pitchFamily="18" charset="0"/>
-                <a:cs typeface="Times New Roman" panose="02020603050405020304" pitchFamily="18" charset="0"/>
-              </a:rPr>
-              <a:t>real </a:t>
-            </a:r>
-            <a:r>
-              <a:rPr lang="es-MX" sz="2500" b="1" dirty="0" smtClean="0">
-                <a:latin typeface="Times New Roman" panose="02020603050405020304" pitchFamily="18" charset="0"/>
-                <a:cs typeface="Times New Roman" panose="02020603050405020304" pitchFamily="18" charset="0"/>
-              </a:rPr>
-              <a:t>del </a:t>
-            </a:r>
-            <a:r>
-              <a:rPr lang="es-MX" sz="2500" b="1" dirty="0" smtClean="0">
-                <a:latin typeface="Times New Roman" panose="02020603050405020304" pitchFamily="18" charset="0"/>
-                <a:cs typeface="Times New Roman" panose="02020603050405020304" pitchFamily="18" charset="0"/>
-              </a:rPr>
-              <a:t>mundo</a:t>
+              <a:t>Estado real del mundo</a:t>
             </a:r>
             <a:endParaRPr lang="es-MX" sz="2500" b="1" dirty="0">
               <a:latin typeface="Times New Roman" panose="02020603050405020304" pitchFamily="18" charset="0"/>
@@ -3303,21 +3276,7 @@
                 <a:latin typeface="Times New Roman" panose="02020603050405020304" pitchFamily="18" charset="0"/>
                 <a:cs typeface="Times New Roman" panose="02020603050405020304" pitchFamily="18" charset="0"/>
               </a:rPr>
-              <a:t>“Sí</a:t>
-            </a:r>
-            <a:r>
-              <a:rPr lang="es-MX" sz="2100" dirty="0" smtClean="0">
-                <a:latin typeface="Times New Roman" panose="02020603050405020304" pitchFamily="18" charset="0"/>
-                <a:cs typeface="Times New Roman" panose="02020603050405020304" pitchFamily="18" charset="0"/>
-              </a:rPr>
-              <a:t>, </a:t>
-            </a:r>
-            <a:r>
-              <a:rPr lang="es-MX" sz="2100" dirty="0" smtClean="0">
-                <a:latin typeface="Times New Roman" panose="02020603050405020304" pitchFamily="18" charset="0"/>
-                <a:cs typeface="Times New Roman" panose="02020603050405020304" pitchFamily="18" charset="0"/>
-              </a:rPr>
-              <a:t> ahí está</a:t>
+              <a:t>“Sí,  ahí está</a:t>
             </a:r>
           </a:p>
           <a:p>
@@ -3364,38 +3323,17 @@
                 <a:latin typeface="Times New Roman" panose="02020603050405020304" pitchFamily="18" charset="0"/>
                 <a:cs typeface="Times New Roman" panose="02020603050405020304" pitchFamily="18" charset="0"/>
               </a:rPr>
-              <a:t>“</a:t>
-            </a:r>
+              <a:t>“No, </a:t>
+            </a:r>
+          </a:p>
+          <a:p>
+            <a:pPr algn="ctr"/>
             <a:r>
               <a:rPr lang="es-MX" sz="2100" dirty="0" smtClean="0">
                 <a:latin typeface="Times New Roman" panose="02020603050405020304" pitchFamily="18" charset="0"/>
                 <a:cs typeface="Times New Roman" panose="02020603050405020304" pitchFamily="18" charset="0"/>
               </a:rPr>
-              <a:t>No, </a:t>
-            </a:r>
-          </a:p>
-          <a:p>
-            <a:pPr algn="ctr"/>
-            <a:r>
-              <a:rPr lang="es-MX" sz="2100" dirty="0" smtClean="0">
-                <a:latin typeface="Times New Roman" panose="02020603050405020304" pitchFamily="18" charset="0"/>
-                <a:cs typeface="Times New Roman" panose="02020603050405020304" pitchFamily="18" charset="0"/>
-              </a:rPr>
-              <a:t> </a:t>
-            </a:r>
-            <a:r>
-              <a:rPr lang="es-MX" sz="2100" dirty="0" smtClean="0">
-                <a:latin typeface="Times New Roman" panose="02020603050405020304" pitchFamily="18" charset="0"/>
-                <a:cs typeface="Times New Roman" panose="02020603050405020304" pitchFamily="18" charset="0"/>
-              </a:rPr>
-              <a:t>no hay </a:t>
-            </a:r>
-            <a:r>
-              <a:rPr lang="es-MX" sz="2100" dirty="0" smtClean="0">
-                <a:latin typeface="Times New Roman" panose="02020603050405020304" pitchFamily="18" charset="0"/>
-                <a:cs typeface="Times New Roman" panose="02020603050405020304" pitchFamily="18" charset="0"/>
-              </a:rPr>
-              <a:t>señal”</a:t>
+              <a:t> no hay señal”</a:t>
             </a:r>
             <a:endParaRPr lang="es-MX" sz="2100" dirty="0">
               <a:latin typeface="Times New Roman" panose="02020603050405020304" pitchFamily="18" charset="0"/>
@@ -3448,13 +3386,6 @@
               </a:rPr>
               <a:t>Omisión</a:t>
             </a:r>
-            <a:endParaRPr lang="es-MX" sz="2200" b="1" dirty="0" smtClean="0">
-              <a:solidFill>
-                <a:schemeClr val="accent3">
-                  <a:lumMod val="75000"/>
-                </a:schemeClr>
-              </a:solidFill>
-            </a:endParaRPr>
           </a:p>
           <a:p>
             <a:pPr algn="ctr"/>
@@ -3807,28 +3738,7 @@
                 <a:latin typeface="Times New Roman" panose="02020603050405020304" pitchFamily="18" charset="0"/>
                 <a:cs typeface="Times New Roman" panose="02020603050405020304" pitchFamily="18" charset="0"/>
               </a:rPr>
-              <a:t>Estado </a:t>
-            </a:r>
-            <a:r>
-              <a:rPr lang="es-MX" sz="2500" b="1" dirty="0" smtClean="0">
-                <a:latin typeface="Times New Roman" panose="02020603050405020304" pitchFamily="18" charset="0"/>
-                <a:cs typeface="Times New Roman" panose="02020603050405020304" pitchFamily="18" charset="0"/>
-              </a:rPr>
-              <a:t>real </a:t>
-            </a:r>
-            <a:r>
-              <a:rPr lang="es-MX" sz="2500" b="1" dirty="0" smtClean="0">
-                <a:latin typeface="Times New Roman" panose="02020603050405020304" pitchFamily="18" charset="0"/>
-                <a:cs typeface="Times New Roman" panose="02020603050405020304" pitchFamily="18" charset="0"/>
-              </a:rPr>
-              <a:t>del </a:t>
-            </a:r>
-            <a:r>
-              <a:rPr lang="es-MX" sz="2500" b="1" dirty="0" smtClean="0">
-                <a:latin typeface="Times New Roman" panose="02020603050405020304" pitchFamily="18" charset="0"/>
-                <a:cs typeface="Times New Roman" panose="02020603050405020304" pitchFamily="18" charset="0"/>
-              </a:rPr>
-              <a:t>mundo</a:t>
+              <a:t>Estado real del mundo</a:t>
             </a:r>
             <a:endParaRPr lang="es-MX" sz="2500" b="1" dirty="0">
               <a:latin typeface="Times New Roman" panose="02020603050405020304" pitchFamily="18" charset="0"/>
@@ -3985,21 +3895,7 @@
                 <a:latin typeface="Times New Roman" panose="02020603050405020304" pitchFamily="18" charset="0"/>
                 <a:cs typeface="Times New Roman" panose="02020603050405020304" pitchFamily="18" charset="0"/>
               </a:rPr>
-              <a:t>“¡Sí</a:t>
-            </a:r>
-            <a:r>
-              <a:rPr lang="es-MX" sz="2100" dirty="0" smtClean="0">
-                <a:latin typeface="Times New Roman" panose="02020603050405020304" pitchFamily="18" charset="0"/>
-                <a:cs typeface="Times New Roman" panose="02020603050405020304" pitchFamily="18" charset="0"/>
-              </a:rPr>
-              <a:t>, </a:t>
-            </a:r>
-            <a:r>
-              <a:rPr lang="es-MX" sz="2100" dirty="0" smtClean="0">
-                <a:latin typeface="Times New Roman" panose="02020603050405020304" pitchFamily="18" charset="0"/>
-                <a:cs typeface="Times New Roman" panose="02020603050405020304" pitchFamily="18" charset="0"/>
-              </a:rPr>
-              <a:t> es un depredador!”</a:t>
+              <a:t>“¡Sí,  es un depredador!”</a:t>
             </a:r>
             <a:endParaRPr lang="es-MX" sz="2100" dirty="0">
               <a:latin typeface="Times New Roman" panose="02020603050405020304" pitchFamily="18" charset="0"/>
@@ -4036,14 +3932,7 @@
                 <a:latin typeface="Times New Roman" panose="02020603050405020304" pitchFamily="18" charset="0"/>
                 <a:cs typeface="Times New Roman" panose="02020603050405020304" pitchFamily="18" charset="0"/>
               </a:rPr>
-              <a:t>“</a:t>
-            </a:r>
-            <a:r>
-              <a:rPr lang="es-MX" sz="2100" dirty="0" smtClean="0">
-                <a:latin typeface="Times New Roman" panose="02020603050405020304" pitchFamily="18" charset="0"/>
-                <a:cs typeface="Times New Roman" panose="02020603050405020304" pitchFamily="18" charset="0"/>
-              </a:rPr>
-              <a:t>No, debió ser otra cosa”</a:t>
+              <a:t>“No, debió ser otra cosa”</a:t>
             </a:r>
             <a:endParaRPr lang="es-MX" sz="2100" dirty="0">
               <a:latin typeface="Times New Roman" panose="02020603050405020304" pitchFamily="18" charset="0"/>
@@ -4275,6 +4164,618 @@
     <p:extLst>
       <p:ext uri="{BB962C8B-B14F-4D97-AF65-F5344CB8AC3E}">
         <p14:creationId xmlns:p14="http://schemas.microsoft.com/office/powerpoint/2010/main" val="3966155208"/>
+      </p:ext>
+    </p:extLst>
+  </p:cSld>
+  <p:clrMapOvr>
+    <a:masterClrMapping/>
+  </p:clrMapOvr>
+  <p:timing>
+    <p:tnLst>
+      <p:par>
+        <p:cTn id="1" dur="indefinite" restart="never" nodeType="tmRoot"/>
+      </p:par>
+    </p:tnLst>
+  </p:timing>
+</p:sld>
+</file>
+
+<file path=ppt/slides/slide3.xml><?xml version="1.0" encoding="utf-8"?>
+<p:sld xmlns:a="http://schemas.openxmlformats.org/drawingml/2006/main" xmlns:r="http://schemas.openxmlformats.org/officeDocument/2006/relationships" xmlns:p="http://schemas.openxmlformats.org/presentationml/2006/main">
+  <p:cSld>
+    <p:spTree>
+      <p:nvGrpSpPr>
+        <p:cNvPr id="1" name=""/>
+        <p:cNvGrpSpPr/>
+        <p:nvPr/>
+      </p:nvGrpSpPr>
+      <p:grpSpPr>
+        <a:xfrm>
+          <a:off x="0" y="0"/>
+          <a:ext cx="0" cy="0"/>
+          <a:chOff x="0" y="0"/>
+          <a:chExt cx="0" cy="0"/>
+        </a:xfrm>
+      </p:grpSpPr>
+      <p:sp>
+        <p:nvSpPr>
+          <p:cNvPr id="2" name="Título 1"/>
+          <p:cNvSpPr>
+            <a:spLocks noGrp="1"/>
+          </p:cNvSpPr>
+          <p:nvPr>
+            <p:ph type="title"/>
+          </p:nvPr>
+        </p:nvSpPr>
+        <p:spPr/>
+        <p:txBody>
+          <a:bodyPr/>
+          <a:lstStyle/>
+          <a:p>
+            <a:r>
+              <a:rPr lang="es-MX" dirty="0" smtClean="0"/>
+              <a:t/>
+            </a:r>
+            <a:br>
+              <a:rPr lang="es-MX" dirty="0" smtClean="0"/>
+            </a:br>
+            <a:endParaRPr lang="es-MX" dirty="0"/>
+          </a:p>
+        </p:txBody>
+      </p:sp>
+      <p:sp>
+        <p:nvSpPr>
+          <p:cNvPr id="3" name="Marcador de contenido 2"/>
+          <p:cNvSpPr>
+            <a:spLocks noGrp="1"/>
+          </p:cNvSpPr>
+          <p:nvPr>
+            <p:ph idx="1"/>
+          </p:nvPr>
+        </p:nvSpPr>
+        <p:spPr/>
+        <p:txBody>
+          <a:bodyPr/>
+          <a:lstStyle/>
+          <a:p>
+            <a:endParaRPr lang="es-MX" dirty="0" smtClean="0"/>
+          </a:p>
+          <a:p>
+            <a:endParaRPr lang="es-MX" dirty="0"/>
+          </a:p>
+        </p:txBody>
+      </p:sp>
+      <p:graphicFrame>
+        <p:nvGraphicFramePr>
+          <p:cNvPr id="4" name="Tabla 3"/>
+          <p:cNvGraphicFramePr>
+            <a:graphicFrameLocks noGrp="1"/>
+          </p:cNvGraphicFramePr>
+          <p:nvPr>
+            <p:extLst>
+              <p:ext uri="{D42A27DB-BD31-4B8C-83A1-F6EECF244321}">
+                <p14:modId xmlns:p14="http://schemas.microsoft.com/office/powerpoint/2010/main" val="3320539124"/>
+              </p:ext>
+            </p:extLst>
+          </p:nvPr>
+        </p:nvGraphicFramePr>
+        <p:xfrm>
+          <a:off x="741874" y="2539839"/>
+          <a:ext cx="10021978" cy="2026920"/>
+        </p:xfrm>
+        <a:graphic>
+          <a:graphicData uri="http://schemas.openxmlformats.org/drawingml/2006/table">
+            <a:tbl>
+              <a:tblPr firstRow="1" bandRow="1">
+                <a:tableStyleId>{5940675A-B579-460E-94D1-54222C63F5DA}</a:tableStyleId>
+              </a:tblPr>
+              <a:tblGrid>
+                <a:gridCol w="256813"/>
+                <a:gridCol w="1528854"/>
+                <a:gridCol w="1595886"/>
+                <a:gridCol w="1673525"/>
+                <a:gridCol w="1613140"/>
+                <a:gridCol w="1647645"/>
+                <a:gridCol w="1706115"/>
+              </a:tblGrid>
+              <a:tr h="370840">
+                <a:tc rowSpan="3">
+                  <a:txBody>
+                    <a:bodyPr/>
+                    <a:lstStyle/>
+                    <a:p>
+                      <a:endParaRPr lang="es-MX" u="none" dirty="0"/>
+                    </a:p>
+                  </a:txBody>
+                  <a:tcPr>
+                    <a:lnL w="12700" cap="flat" cmpd="sng" algn="ctr">
+                      <a:noFill/>
+                      <a:prstDash val="solid"/>
+                      <a:round/>
+                      <a:headEnd type="none" w="med" len="med"/>
+                      <a:tailEnd type="none" w="med" len="med"/>
+                    </a:lnL>
+                    <a:lnR w="12700" cap="flat" cmpd="sng" algn="ctr">
+                      <a:solidFill>
+                        <a:schemeClr val="tx1"/>
+                      </a:solidFill>
+                      <a:prstDash val="solid"/>
+                      <a:round/>
+                      <a:headEnd type="none" w="med" len="med"/>
+                      <a:tailEnd type="none" w="med" len="med"/>
+                    </a:lnR>
+                    <a:lnT w="12700" cap="flat" cmpd="sng" algn="ctr">
+                      <a:noFill/>
+                      <a:prstDash val="solid"/>
+                      <a:round/>
+                      <a:headEnd type="none" w="med" len="med"/>
+                      <a:tailEnd type="none" w="med" len="med"/>
+                    </a:lnT>
+                    <a:lnB w="12700" cap="flat" cmpd="sng" algn="ctr">
+                      <a:noFill/>
+                      <a:prstDash val="solid"/>
+                      <a:round/>
+                      <a:headEnd type="none" w="med" len="med"/>
+                      <a:tailEnd type="none" w="med" len="med"/>
+                    </a:lnB>
+                    <a:lnTlToBr w="12700" cmpd="sng">
+                      <a:noFill/>
+                      <a:prstDash val="solid"/>
+                    </a:lnTlToBr>
+                    <a:lnBlToTr w="12700" cmpd="sng">
+                      <a:noFill/>
+                      <a:prstDash val="solid"/>
+                    </a:lnBlToTr>
+                  </a:tcPr>
+                </a:tc>
+                <a:tc>
+                  <a:txBody>
+                    <a:bodyPr/>
+                    <a:lstStyle/>
+                    <a:p>
+                      <a:pPr algn="ctr"/>
+                      <a:r>
+                        <a:rPr lang="es-MX" dirty="0" smtClean="0"/>
+                        <a:t>1</a:t>
+                      </a:r>
+                      <a:endParaRPr lang="es-MX" dirty="0"/>
+                    </a:p>
+                  </a:txBody>
+                  <a:tcPr>
+                    <a:lnL w="12700" cap="flat" cmpd="sng" algn="ctr">
+                      <a:solidFill>
+                        <a:schemeClr val="tx1"/>
+                      </a:solidFill>
+                      <a:prstDash val="solid"/>
+                      <a:round/>
+                      <a:headEnd type="none" w="med" len="med"/>
+                      <a:tailEnd type="none" w="med" len="med"/>
+                    </a:lnL>
+                    <a:lnR w="12700" cap="flat" cmpd="sng" algn="ctr">
+                      <a:solidFill>
+                        <a:schemeClr val="tx1"/>
+                      </a:solidFill>
+                      <a:prstDash val="solid"/>
+                      <a:round/>
+                      <a:headEnd type="none" w="med" len="med"/>
+                      <a:tailEnd type="none" w="med" len="med"/>
+                    </a:lnR>
+                    <a:lnT w="12700" cap="flat" cmpd="sng" algn="ctr">
+                      <a:solidFill>
+                        <a:schemeClr val="tx1"/>
+                      </a:solidFill>
+                      <a:prstDash val="solid"/>
+                      <a:round/>
+                      <a:headEnd type="none" w="med" len="med"/>
+                      <a:tailEnd type="none" w="med" len="med"/>
+                    </a:lnT>
+                    <a:lnB w="12700" cap="flat" cmpd="sng" algn="ctr">
+                      <a:solidFill>
+                        <a:schemeClr val="tx1"/>
+                      </a:solidFill>
+                      <a:prstDash val="solid"/>
+                      <a:round/>
+                      <a:headEnd type="none" w="med" len="med"/>
+                      <a:tailEnd type="none" w="med" len="med"/>
+                    </a:lnB>
+                    <a:lnTlToBr w="12700" cmpd="sng">
+                      <a:noFill/>
+                      <a:prstDash val="solid"/>
+                    </a:lnTlToBr>
+                    <a:lnBlToTr w="12700" cmpd="sng">
+                      <a:noFill/>
+                      <a:prstDash val="solid"/>
+                    </a:lnBlToTr>
+                  </a:tcPr>
+                </a:tc>
+                <a:tc>
+                  <a:txBody>
+                    <a:bodyPr/>
+                    <a:lstStyle/>
+                    <a:p>
+                      <a:pPr algn="ctr"/>
+                      <a:r>
+                        <a:rPr lang="es-MX" dirty="0" smtClean="0"/>
+                        <a:t>2</a:t>
+                      </a:r>
+                      <a:endParaRPr lang="es-MX" dirty="0"/>
+                    </a:p>
+                  </a:txBody>
+                  <a:tcPr>
+                    <a:lnL w="12700" cap="flat" cmpd="sng" algn="ctr">
+                      <a:solidFill>
+                        <a:schemeClr val="tx1"/>
+                      </a:solidFill>
+                      <a:prstDash val="solid"/>
+                      <a:round/>
+                      <a:headEnd type="none" w="med" len="med"/>
+                      <a:tailEnd type="none" w="med" len="med"/>
+                    </a:lnL>
+                  </a:tcPr>
+                </a:tc>
+                <a:tc>
+                  <a:txBody>
+                    <a:bodyPr/>
+                    <a:lstStyle/>
+                    <a:p>
+                      <a:pPr algn="ctr"/>
+                      <a:r>
+                        <a:rPr lang="es-MX" dirty="0" smtClean="0"/>
+                        <a:t>3</a:t>
+                      </a:r>
+                      <a:endParaRPr lang="es-MX" dirty="0"/>
+                    </a:p>
+                  </a:txBody>
+                  <a:tcPr/>
+                </a:tc>
+                <a:tc>
+                  <a:txBody>
+                    <a:bodyPr/>
+                    <a:lstStyle/>
+                    <a:p>
+                      <a:pPr algn="ctr"/>
+                      <a:r>
+                        <a:rPr lang="es-MX" dirty="0" smtClean="0"/>
+                        <a:t>4</a:t>
+                      </a:r>
+                      <a:endParaRPr lang="es-MX" dirty="0"/>
+                    </a:p>
+                  </a:txBody>
+                  <a:tcPr/>
+                </a:tc>
+                <a:tc>
+                  <a:txBody>
+                    <a:bodyPr/>
+                    <a:lstStyle/>
+                    <a:p>
+                      <a:pPr algn="ctr"/>
+                      <a:r>
+                        <a:rPr lang="es-MX" dirty="0" smtClean="0"/>
+                        <a:t>5</a:t>
+                      </a:r>
+                      <a:endParaRPr lang="es-MX" dirty="0"/>
+                    </a:p>
+                  </a:txBody>
+                  <a:tcPr/>
+                </a:tc>
+                <a:tc>
+                  <a:txBody>
+                    <a:bodyPr/>
+                    <a:lstStyle/>
+                    <a:p>
+                      <a:pPr algn="ctr"/>
+                      <a:r>
+                        <a:rPr lang="es-MX" dirty="0" smtClean="0"/>
+                        <a:t>6</a:t>
+                      </a:r>
+                      <a:endParaRPr lang="es-MX" dirty="0"/>
+                    </a:p>
+                  </a:txBody>
+                  <a:tcPr/>
+                </a:tc>
+              </a:tr>
+              <a:tr h="741680">
+                <a:tc vMerge="1">
+                  <a:txBody>
+                    <a:bodyPr/>
+                    <a:lstStyle/>
+                    <a:p>
+                      <a:endParaRPr lang="es-MX" dirty="0"/>
+                    </a:p>
+                  </a:txBody>
+                  <a:tcPr/>
+                </a:tc>
+                <a:tc>
+                  <a:txBody>
+                    <a:bodyPr/>
+                    <a:lstStyle/>
+                    <a:p>
+                      <a:pPr algn="ctr"/>
+                      <a:r>
+                        <a:rPr lang="es-MX" u="none" dirty="0" smtClean="0"/>
+                        <a:t>“Muy poco seguro que es Señal”</a:t>
+                      </a:r>
+                      <a:endParaRPr lang="es-MX" u="none" dirty="0"/>
+                    </a:p>
+                  </a:txBody>
+                  <a:tcPr>
+                    <a:lnL w="12700" cap="flat" cmpd="sng" algn="ctr">
+                      <a:solidFill>
+                        <a:schemeClr val="tx1"/>
+                      </a:solidFill>
+                      <a:prstDash val="solid"/>
+                      <a:round/>
+                      <a:headEnd type="none" w="med" len="med"/>
+                      <a:tailEnd type="none" w="med" len="med"/>
+                    </a:lnL>
+                    <a:lnR w="12700" cap="flat" cmpd="sng" algn="ctr">
+                      <a:solidFill>
+                        <a:schemeClr val="tx1"/>
+                      </a:solidFill>
+                      <a:prstDash val="solid"/>
+                      <a:round/>
+                      <a:headEnd type="none" w="med" len="med"/>
+                      <a:tailEnd type="none" w="med" len="med"/>
+                    </a:lnR>
+                    <a:lnT w="12700" cap="flat" cmpd="sng" algn="ctr">
+                      <a:solidFill>
+                        <a:schemeClr val="tx1"/>
+                      </a:solidFill>
+                      <a:prstDash val="solid"/>
+                      <a:round/>
+                      <a:headEnd type="none" w="med" len="med"/>
+                      <a:tailEnd type="none" w="med" len="med"/>
+                    </a:lnT>
+                    <a:lnB w="12700" cap="flat" cmpd="sng" algn="ctr">
+                      <a:solidFill>
+                        <a:schemeClr val="tx1"/>
+                      </a:solidFill>
+                      <a:prstDash val="solid"/>
+                      <a:round/>
+                      <a:headEnd type="none" w="med" len="med"/>
+                      <a:tailEnd type="none" w="med" len="med"/>
+                    </a:lnB>
+                    <a:lnTlToBr w="12700" cmpd="sng">
+                      <a:noFill/>
+                      <a:prstDash val="solid"/>
+                    </a:lnTlToBr>
+                    <a:lnBlToTr w="12700" cmpd="sng">
+                      <a:noFill/>
+                      <a:prstDash val="solid"/>
+                    </a:lnBlToTr>
+                  </a:tcPr>
+                </a:tc>
+                <a:tc>
+                  <a:txBody>
+                    <a:bodyPr/>
+                    <a:lstStyle/>
+                    <a:p>
+                      <a:pPr algn="ctr"/>
+                      <a:endParaRPr lang="es-MX" dirty="0"/>
+                    </a:p>
+                  </a:txBody>
+                  <a:tcPr>
+                    <a:lnL w="12700" cap="flat" cmpd="sng" algn="ctr">
+                      <a:solidFill>
+                        <a:schemeClr val="tx1"/>
+                      </a:solidFill>
+                      <a:prstDash val="solid"/>
+                      <a:round/>
+                      <a:headEnd type="none" w="med" len="med"/>
+                      <a:tailEnd type="none" w="med" len="med"/>
+                    </a:lnL>
+                  </a:tcPr>
+                </a:tc>
+                <a:tc>
+                  <a:txBody>
+                    <a:bodyPr/>
+                    <a:lstStyle/>
+                    <a:p>
+                      <a:pPr algn="ctr"/>
+                      <a:endParaRPr lang="es-MX" dirty="0"/>
+                    </a:p>
+                  </a:txBody>
+                  <a:tcPr/>
+                </a:tc>
+                <a:tc>
+                  <a:txBody>
+                    <a:bodyPr/>
+                    <a:lstStyle/>
+                    <a:p>
+                      <a:pPr algn="ctr"/>
+                      <a:endParaRPr lang="es-MX" dirty="0"/>
+                    </a:p>
+                  </a:txBody>
+                  <a:tcPr/>
+                </a:tc>
+                <a:tc>
+                  <a:txBody>
+                    <a:bodyPr/>
+                    <a:lstStyle/>
+                    <a:p>
+                      <a:pPr algn="ctr"/>
+                      <a:endParaRPr lang="es-MX" dirty="0"/>
+                    </a:p>
+                  </a:txBody>
+                  <a:tcPr/>
+                </a:tc>
+                <a:tc>
+                  <a:txBody>
+                    <a:bodyPr/>
+                    <a:lstStyle/>
+                    <a:p>
+                      <a:pPr algn="ctr"/>
+                      <a:r>
+                        <a:rPr lang="es-MX" dirty="0" smtClean="0"/>
+                        <a:t>“Muy</a:t>
+                      </a:r>
+                      <a:r>
+                        <a:rPr lang="es-MX" baseline="0" dirty="0" smtClean="0"/>
+                        <a:t> seguro que es Señal”</a:t>
+                      </a:r>
+                      <a:endParaRPr lang="es-MX" dirty="0"/>
+                    </a:p>
+                  </a:txBody>
+                  <a:tcPr/>
+                </a:tc>
+              </a:tr>
+              <a:tr h="741680">
+                <a:tc vMerge="1">
+                  <a:txBody>
+                    <a:bodyPr/>
+                    <a:lstStyle/>
+                    <a:p>
+                      <a:endParaRPr lang="es-MX" dirty="0"/>
+                    </a:p>
+                  </a:txBody>
+                  <a:tcPr/>
+                </a:tc>
+                <a:tc>
+                  <a:txBody>
+                    <a:bodyPr/>
+                    <a:lstStyle/>
+                    <a:p>
+                      <a:pPr algn="ctr"/>
+                      <a:r>
+                        <a:rPr lang="es-MX" dirty="0" smtClean="0"/>
+                        <a:t>“Muy seguro</a:t>
+                      </a:r>
+                      <a:r>
+                        <a:rPr lang="es-MX" baseline="0" dirty="0" smtClean="0"/>
+                        <a:t> que es Ruido”</a:t>
+                      </a:r>
+                      <a:endParaRPr lang="es-MX" dirty="0"/>
+                    </a:p>
+                  </a:txBody>
+                  <a:tcPr>
+                    <a:lnL w="12700" cap="flat" cmpd="sng" algn="ctr">
+                      <a:solidFill>
+                        <a:schemeClr val="tx1"/>
+                      </a:solidFill>
+                      <a:prstDash val="solid"/>
+                      <a:round/>
+                      <a:headEnd type="none" w="med" len="med"/>
+                      <a:tailEnd type="none" w="med" len="med"/>
+                    </a:lnL>
+                    <a:lnR w="12700" cap="flat" cmpd="sng" algn="ctr">
+                      <a:solidFill>
+                        <a:schemeClr val="tx1"/>
+                      </a:solidFill>
+                      <a:prstDash val="solid"/>
+                      <a:round/>
+                      <a:headEnd type="none" w="med" len="med"/>
+                      <a:tailEnd type="none" w="med" len="med"/>
+                    </a:lnR>
+                    <a:lnT w="12700" cap="flat" cmpd="sng" algn="ctr">
+                      <a:solidFill>
+                        <a:schemeClr val="tx1"/>
+                      </a:solidFill>
+                      <a:prstDash val="solid"/>
+                      <a:round/>
+                      <a:headEnd type="none" w="med" len="med"/>
+                      <a:tailEnd type="none" w="med" len="med"/>
+                    </a:lnT>
+                    <a:lnB w="12700" cap="flat" cmpd="sng" algn="ctr">
+                      <a:solidFill>
+                        <a:schemeClr val="tx1"/>
+                      </a:solidFill>
+                      <a:prstDash val="solid"/>
+                      <a:round/>
+                      <a:headEnd type="none" w="med" len="med"/>
+                      <a:tailEnd type="none" w="med" len="med"/>
+                    </a:lnB>
+                    <a:lnTlToBr w="12700" cmpd="sng">
+                      <a:noFill/>
+                      <a:prstDash val="solid"/>
+                    </a:lnTlToBr>
+                    <a:lnBlToTr w="12700" cmpd="sng">
+                      <a:noFill/>
+                      <a:prstDash val="solid"/>
+                    </a:lnBlToTr>
+                  </a:tcPr>
+                </a:tc>
+                <a:tc>
+                  <a:txBody>
+                    <a:bodyPr/>
+                    <a:lstStyle/>
+                    <a:p>
+                      <a:pPr algn="ctr"/>
+                      <a:endParaRPr lang="es-MX" dirty="0"/>
+                    </a:p>
+                  </a:txBody>
+                  <a:tcPr>
+                    <a:lnL w="12700" cap="flat" cmpd="sng" algn="ctr">
+                      <a:solidFill>
+                        <a:schemeClr val="tx1"/>
+                      </a:solidFill>
+                      <a:prstDash val="solid"/>
+                      <a:round/>
+                      <a:headEnd type="none" w="med" len="med"/>
+                      <a:tailEnd type="none" w="med" len="med"/>
+                    </a:lnL>
+                  </a:tcPr>
+                </a:tc>
+                <a:tc>
+                  <a:txBody>
+                    <a:bodyPr/>
+                    <a:lstStyle/>
+                    <a:p>
+                      <a:pPr algn="ctr"/>
+                      <a:endParaRPr lang="es-MX" dirty="0"/>
+                    </a:p>
+                  </a:txBody>
+                  <a:tcPr/>
+                </a:tc>
+                <a:tc>
+                  <a:txBody>
+                    <a:bodyPr/>
+                    <a:lstStyle/>
+                    <a:p>
+                      <a:pPr algn="ctr"/>
+                      <a:endParaRPr lang="es-MX" dirty="0"/>
+                    </a:p>
+                  </a:txBody>
+                  <a:tcPr/>
+                </a:tc>
+                <a:tc>
+                  <a:txBody>
+                    <a:bodyPr/>
+                    <a:lstStyle/>
+                    <a:p>
+                      <a:pPr algn="ctr"/>
+                      <a:endParaRPr lang="es-MX" dirty="0"/>
+                    </a:p>
+                  </a:txBody>
+                  <a:tcPr/>
+                </a:tc>
+                <a:tc>
+                  <a:txBody>
+                    <a:bodyPr/>
+                    <a:lstStyle/>
+                    <a:p>
+                      <a:pPr algn="ctr"/>
+                      <a:r>
+                        <a:rPr lang="es-MX" dirty="0" smtClean="0"/>
+                        <a:t>“Muy seguro que</a:t>
+                      </a:r>
+                      <a:r>
+                        <a:rPr lang="es-MX" baseline="0" dirty="0" smtClean="0"/>
+                        <a:t> es Señal”</a:t>
+                      </a:r>
+                      <a:endParaRPr lang="es-MX" dirty="0"/>
+                    </a:p>
+                  </a:txBody>
+                  <a:tcPr/>
+                </a:tc>
+              </a:tr>
+            </a:tbl>
+          </a:graphicData>
+        </a:graphic>
+      </p:graphicFrame>
+    </p:spTree>
+    <p:extLst>
+      <p:ext uri="{BB962C8B-B14F-4D97-AF65-F5344CB8AC3E}">
+        <p14:creationId xmlns:p14="http://schemas.microsoft.com/office/powerpoint/2010/main" val="3318865644"/>
       </p:ext>
     </p:extLst>
   </p:cSld>

</xml_diff>